<commit_message>
Added some changes to the Technology
Added the following: Dapper, Material-Design Nuget Packages.
</commit_message>
<xml_diff>
--- a/PitchPresentation/PitchPresentation.pptx
+++ b/PitchPresentation/PitchPresentation.pptx
@@ -3545,13 +3545,8 @@
           <a:p>
             <a:r>
               <a:rPr lang="en-US" sz="2400" dirty="0"/>
-              <a:t>W. </a:t>
-            </a:r>
-            <a:r>
-              <a:rPr lang="en-US" sz="2400" dirty="0" err="1"/>
-              <a:t>Merrit</a:t>
-            </a:r>
-            <a:endParaRPr lang="en-US" sz="2400" dirty="0"/>
+              <a:t>W. Merritt</a:t>
+            </a:r>
           </a:p>
           <a:p>
             <a:r>
@@ -4243,6 +4238,27 @@
             <a:endParaRPr lang="en-US" sz="2400" dirty="0"/>
           </a:p>
           <a:p>
+            <a:r>
+              <a:rPr lang="en-US" sz="2400"/>
+              <a:t>Dapper </a:t>
+            </a:r>
+            <a:endParaRPr lang="en-US" sz="2400" dirty="0"/>
+          </a:p>
+          <a:p>
+            <a:r>
+              <a:rPr lang="en-US" sz="2400" dirty="0"/>
+              <a:t>Material-Design (C# </a:t>
+            </a:r>
+            <a:r>
+              <a:rPr lang="en-US" sz="2400" dirty="0" err="1"/>
+              <a:t>Nuget</a:t>
+            </a:r>
+            <a:r>
+              <a:rPr lang="en-US" sz="2400" dirty="0"/>
+              <a:t> Package)</a:t>
+            </a:r>
+          </a:p>
+          <a:p>
             <a:endParaRPr lang="en-US" sz="2400" dirty="0"/>
           </a:p>
         </p:txBody>

</xml_diff>